<commit_message>
Anleitung und Protokolle gepatcht. Stand der Technik vom letzten Commit steht noch aus Vorlage.dwt wurde auf utf-8 geändert. Dadurch kann man nun Umlaute nutzen.
Signed-off-by: Mirko <MightyMirko@users.noreply.github.com>
</commit_message>
<xml_diff>
--- a/data/180307_blackbox.pptx
+++ b/data/180307_blackbox.pptx
@@ -2835,7 +2835,7 @@
               <a:ea typeface="+mn-ea"/>
               <a:cs typeface="+mn-cs"/>
             </a:rPr>
-            <a:t>Datenübertragung</a:t>
+            <a:t>Datenüber-tragung</a:t>
           </a:r>
         </a:p>
       </dgm:t>
@@ -2887,7 +2887,7 @@
       <dgm:spPr/>
     </dgm:pt>
     <dgm:pt modelId="{43148E34-7B04-427F-8BF4-0FD53E1AB270}" type="pres">
-      <dgm:prSet presAssocID="{3A38AC63-9045-484D-A093-B6E01DB070D3}" presName="childCenter1" presStyleLbl="node1" presStyleIdx="1" presStyleCnt="14" custLinFactNeighborX="1775"/>
+      <dgm:prSet presAssocID="{3A38AC63-9045-484D-A093-B6E01DB070D3}" presName="childCenter1" presStyleLbl="node1" presStyleIdx="1" presStyleCnt="14" custScaleX="134522" custLinFactNeighborX="1775"/>
       <dgm:spPr>
         <a:prstGeom prst="downArrow">
           <a:avLst/>
@@ -2947,7 +2947,7 @@
       <dgm:spPr/>
     </dgm:pt>
     <dgm:pt modelId="{B5D8626A-A7BA-4042-9168-3AFB2A2A960D}" type="pres">
-      <dgm:prSet presAssocID="{7A78B9E6-307C-40A9-86E0-4E5A21502C23}" presName="text2" presStyleLbl="node1" presStyleIdx="5" presStyleCnt="14" custRadScaleRad="188048" custRadScaleInc="1985">
+      <dgm:prSet presAssocID="{7A78B9E6-307C-40A9-86E0-4E5A21502C23}" presName="text2" presStyleLbl="node1" presStyleIdx="5" presStyleCnt="14" custScaleX="120930" custRadScaleRad="188048" custRadScaleInc="1985">
         <dgm:presLayoutVars>
           <dgm:bulletEnabled val="1"/>
         </dgm:presLayoutVars>
@@ -2983,7 +2983,7 @@
       <dgm:spPr/>
     </dgm:pt>
     <dgm:pt modelId="{C27992A3-371A-4FE6-9407-19E27F286D6D}" type="pres">
-      <dgm:prSet presAssocID="{A4D16D5F-688D-43B3-85CF-5D4141F22D40}" presName="childCenter3" presStyleLbl="node1" presStyleIdx="7" presStyleCnt="14" custLinFactNeighborX="2589"/>
+      <dgm:prSet presAssocID="{A4D16D5F-688D-43B3-85CF-5D4141F22D40}" presName="childCenter3" presStyleLbl="node1" presStyleIdx="7" presStyleCnt="14" custScaleX="197317" custLinFactNeighborX="2589"/>
       <dgm:spPr>
         <a:prstGeom prst="upArrow">
           <a:avLst/>
@@ -3063,7 +3063,7 @@
       <dgm:spPr/>
     </dgm:pt>
     <dgm:pt modelId="{432BAD03-D4F2-4816-A5DD-008918EE700F}" type="pres">
-      <dgm:prSet presAssocID="{862B70E5-C1DF-48E2-9C72-A539B53F8664}" presName="text4" presStyleLbl="node1" presStyleIdx="12" presStyleCnt="14" custScaleX="122661" custRadScaleRad="156884" custRadScaleInc="-3779">
+      <dgm:prSet presAssocID="{862B70E5-C1DF-48E2-9C72-A539B53F8664}" presName="text4" presStyleLbl="node1" presStyleIdx="12" presStyleCnt="14" custScaleX="122661" custScaleY="46611" custRadScaleRad="165022" custRadScaleInc="-3509">
         <dgm:presLayoutVars>
           <dgm:bulletEnabled val="1"/>
         </dgm:presLayoutVars>
@@ -4527,9 +4527,9 @@
         <dsp:cNvSpPr/>
       </dsp:nvSpPr>
       <dsp:spPr>
-        <a:xfrm rot="10831565">
-          <a:off x="5388507" y="5413528"/>
-          <a:ext cx="834330" cy="0"/>
+        <a:xfrm rot="10829754">
+          <a:off x="5335494" y="5415667"/>
+          <a:ext cx="843307" cy="0"/>
         </a:xfrm>
         <a:custGeom>
           <a:avLst/>
@@ -4543,7 +4543,7 @@
                 <a:pt x="0" y="0"/>
               </a:moveTo>
               <a:lnTo>
-                <a:pt x="834330" y="0"/>
+                <a:pt x="843307" y="0"/>
               </a:lnTo>
             </a:path>
           </a:pathLst>
@@ -4582,9 +4582,9 @@
         <dsp:cNvSpPr/>
       </dsp:nvSpPr>
       <dsp:spPr>
-        <a:xfrm rot="5368305">
-          <a:off x="6883708" y="6855292"/>
-          <a:ext cx="780699" cy="0"/>
+        <a:xfrm rot="5367490">
+          <a:off x="6843222" y="6867745"/>
+          <a:ext cx="788576" cy="0"/>
         </a:xfrm>
         <a:custGeom>
           <a:avLst/>
@@ -4598,7 +4598,7 @@
                 <a:pt x="0" y="0"/>
               </a:moveTo>
               <a:lnTo>
-                <a:pt x="780699" y="0"/>
+                <a:pt x="788576" y="0"/>
               </a:lnTo>
             </a:path>
           </a:pathLst>
@@ -4637,9 +4637,9 @@
         <dsp:cNvSpPr/>
       </dsp:nvSpPr>
       <dsp:spPr>
-        <a:xfrm rot="21598947">
-          <a:off x="8298957" y="5426381"/>
-          <a:ext cx="1244978" cy="0"/>
+        <a:xfrm rot="21599768">
+          <a:off x="8269011" y="5428252"/>
+          <a:ext cx="1185466" cy="0"/>
         </a:xfrm>
         <a:custGeom>
           <a:avLst/>
@@ -4653,7 +4653,7 @@
                 <a:pt x="0" y="0"/>
               </a:moveTo>
               <a:lnTo>
-                <a:pt x="1244978" y="0"/>
+                <a:pt x="1185466" y="0"/>
               </a:lnTo>
             </a:path>
           </a:pathLst>
@@ -4692,9 +4692,9 @@
         <dsp:cNvSpPr/>
       </dsp:nvSpPr>
       <dsp:spPr>
-        <a:xfrm rot="16189642">
-          <a:off x="6893173" y="4025330"/>
-          <a:ext cx="726985" cy="0"/>
+        <a:xfrm rot="16190074">
+          <a:off x="6853721" y="4017148"/>
+          <a:ext cx="732205" cy="0"/>
         </a:xfrm>
         <a:custGeom>
           <a:avLst/>
@@ -4708,7 +4708,7 @@
                 <a:pt x="0" y="0"/>
               </a:moveTo>
               <a:lnTo>
-                <a:pt x="726985" y="0"/>
+                <a:pt x="732205" y="0"/>
               </a:lnTo>
             </a:path>
           </a:pathLst>
@@ -4748,8 +4748,8 @@
       </dsp:nvSpPr>
       <dsp:spPr>
         <a:xfrm>
-          <a:off x="6222819" y="4388821"/>
-          <a:ext cx="2076137" cy="2076137"/>
+          <a:off x="6178786" y="4383250"/>
+          <a:ext cx="2090224" cy="2090224"/>
         </a:xfrm>
         <a:prstGeom prst="teardrop">
           <a:avLst/>
@@ -4829,8 +4829,8 @@
         </a:p>
       </dsp:txBody>
       <dsp:txXfrm>
-        <a:off x="6526862" y="4692864"/>
-        <a:ext cx="1468051" cy="1468051"/>
+        <a:off x="6484892" y="4689356"/>
+        <a:ext cx="1478012" cy="1478012"/>
       </dsp:txXfrm>
     </dsp:sp>
     <dsp:sp modelId="{43148E34-7B04-427F-8BF4-0FD53E1AB270}">
@@ -4840,8 +4840,8 @@
       </dsp:nvSpPr>
       <dsp:spPr>
         <a:xfrm>
-          <a:off x="6529806" y="2214671"/>
-          <a:ext cx="1447168" cy="1447168"/>
+          <a:off x="6243297" y="2203879"/>
+          <a:ext cx="1946759" cy="1447168"/>
         </a:xfrm>
         <a:prstGeom prst="downArrow">
           <a:avLst/>
@@ -4920,8 +4920,8 @@
         </a:p>
       </dsp:txBody>
       <dsp:txXfrm>
-        <a:off x="6891598" y="2214671"/>
-        <a:ext cx="723584" cy="1085376"/>
+        <a:off x="6729987" y="2203879"/>
+        <a:ext cx="973379" cy="1085376"/>
       </dsp:txXfrm>
     </dsp:sp>
     <dsp:sp modelId="{E0AC7387-3203-4257-A8BB-37D4344C5B68}">
@@ -4931,8 +4931,8 @@
       </dsp:nvSpPr>
       <dsp:spPr>
         <a:xfrm rot="16214614">
-          <a:off x="7003797" y="1960926"/>
-          <a:ext cx="507494" cy="0"/>
+          <a:off x="6955934" y="1938935"/>
+          <a:ext cx="529891" cy="0"/>
         </a:xfrm>
         <a:custGeom>
           <a:avLst/>
@@ -4946,7 +4946,7 @@
                 <a:pt x="0" y="0"/>
               </a:moveTo>
               <a:lnTo>
-                <a:pt x="507494" y="0"/>
+                <a:pt x="529891" y="0"/>
               </a:lnTo>
             </a:path>
           </a:pathLst>
@@ -4986,7 +4986,7 @@
       </dsp:nvSpPr>
       <dsp:spPr>
         <a:xfrm>
-          <a:off x="6538115" y="260013"/>
+          <a:off x="6501498" y="226824"/>
           <a:ext cx="1447168" cy="1447168"/>
         </a:xfrm>
         <a:prstGeom prst="roundRect">
@@ -5067,7 +5067,7 @@
         </a:p>
       </dsp:txBody>
       <dsp:txXfrm>
-        <a:off x="6608760" y="330658"/>
+        <a:off x="6572143" y="297469"/>
         <a:ext cx="1305878" cy="1305878"/>
       </dsp:txXfrm>
     </dsp:sp>
@@ -5078,7 +5078,7 @@
       </dsp:nvSpPr>
       <dsp:spPr>
         <a:xfrm>
-          <a:off x="9543935" y="5034636"/>
+          <a:off x="9454477" y="5036997"/>
           <a:ext cx="2842021" cy="782237"/>
         </a:xfrm>
         <a:prstGeom prst="rightArrow">
@@ -5158,7 +5158,7 @@
         </a:p>
       </dsp:txBody>
       <dsp:txXfrm>
-        <a:off x="9543935" y="5230195"/>
+        <a:off x="9454477" y="5232556"/>
         <a:ext cx="2646462" cy="391119"/>
       </dsp:txXfrm>
     </dsp:sp>
@@ -5169,8 +5169,8 @@
       </dsp:nvSpPr>
       <dsp:spPr>
         <a:xfrm rot="18028297">
-          <a:off x="10622747" y="4033850"/>
-          <a:ext cx="2322330" cy="0"/>
+          <a:off x="10524523" y="4020884"/>
+          <a:ext cx="2357896" cy="0"/>
         </a:xfrm>
         <a:custGeom>
           <a:avLst/>
@@ -5184,7 +5184,7 @@
                 <a:pt x="0" y="0"/>
               </a:moveTo>
               <a:lnTo>
-                <a:pt x="2322330" y="0"/>
+                <a:pt x="2357896" y="0"/>
               </a:lnTo>
             </a:path>
           </a:pathLst>
@@ -5224,7 +5224,7 @@
       </dsp:nvSpPr>
       <dsp:spPr>
         <a:xfrm>
-          <a:off x="10609601" y="2479219"/>
+          <a:off x="10538178" y="2450926"/>
           <a:ext cx="3852173" cy="553845"/>
         </a:xfrm>
         <a:prstGeom prst="roundRect">
@@ -5303,7 +5303,7 @@
         </a:p>
       </dsp:txBody>
       <dsp:txXfrm>
-        <a:off x="10636637" y="2506255"/>
+        <a:off x="10565214" y="2477962"/>
         <a:ext cx="3798101" cy="499773"/>
       </dsp:txXfrm>
     </dsp:sp>
@@ -5313,9 +5313,9 @@
         <dsp:cNvSpPr/>
       </dsp:nvSpPr>
       <dsp:spPr>
-        <a:xfrm rot="21599967">
-          <a:off x="12385957" y="5425739"/>
-          <a:ext cx="628652" cy="0"/>
+        <a:xfrm rot="21599966">
+          <a:off x="12296498" y="5428099"/>
+          <a:ext cx="415218" cy="0"/>
         </a:xfrm>
         <a:custGeom>
           <a:avLst/>
@@ -5329,7 +5329,7 @@
                 <a:pt x="0" y="0"/>
               </a:moveTo>
               <a:lnTo>
-                <a:pt x="628652" y="0"/>
+                <a:pt x="415218" y="0"/>
               </a:lnTo>
             </a:path>
           </a:pathLst>
@@ -5369,8 +5369,8 @@
       </dsp:nvSpPr>
       <dsp:spPr>
         <a:xfrm>
-          <a:off x="13014609" y="4702144"/>
-          <a:ext cx="1447168" cy="1447168"/>
+          <a:off x="12711717" y="4704504"/>
+          <a:ext cx="1750060" cy="1447168"/>
         </a:xfrm>
         <a:prstGeom prst="roundRect">
           <a:avLst/>
@@ -5443,13 +5443,13 @@
               <a:ea typeface="+mn-ea"/>
               <a:cs typeface="+mn-cs"/>
             </a:rPr>
-            <a:t>Datenübertragung</a:t>
+            <a:t>Datenüber-tragung</a:t>
           </a:r>
         </a:p>
       </dsp:txBody>
       <dsp:txXfrm>
-        <a:off x="13085254" y="4772789"/>
-        <a:ext cx="1305878" cy="1305878"/>
+        <a:off x="12782362" y="4775149"/>
+        <a:ext cx="1608770" cy="1305878"/>
       </dsp:txXfrm>
     </dsp:sp>
     <dsp:sp modelId="{8A1CD3BF-ADBE-4CD7-8B76-D048AC80DFC7}">
@@ -5458,9 +5458,9 @@
         <dsp:cNvSpPr/>
       </dsp:nvSpPr>
       <dsp:spPr>
-        <a:xfrm rot="3764493">
-          <a:off x="10500263" y="6909531"/>
-          <a:ext cx="2458310" cy="0"/>
+        <a:xfrm rot="3701180">
+          <a:off x="10423413" y="6929174"/>
+          <a:ext cx="2521545" cy="0"/>
         </a:xfrm>
         <a:custGeom>
           <a:avLst/>
@@ -5474,7 +5474,7 @@
                 <a:pt x="0" y="0"/>
               </a:moveTo>
               <a:lnTo>
-                <a:pt x="2458310" y="0"/>
+                <a:pt x="2521545" y="0"/>
               </a:lnTo>
             </a:path>
           </a:pathLst>
@@ -5514,7 +5514,7 @@
       </dsp:nvSpPr>
       <dsp:spPr>
         <a:xfrm>
-          <a:off x="10570038" y="8002188"/>
+          <a:off x="10570038" y="8039113"/>
           <a:ext cx="3891739" cy="867707"/>
         </a:xfrm>
         <a:prstGeom prst="roundRect">
@@ -5585,7 +5585,7 @@
         </a:p>
       </dsp:txBody>
       <dsp:txXfrm>
-        <a:off x="10612396" y="8044546"/>
+        <a:off x="10612396" y="8081471"/>
         <a:ext cx="3807023" cy="782991"/>
       </dsp:txXfrm>
     </dsp:sp>
@@ -5596,8 +5596,8 @@
       </dsp:nvSpPr>
       <dsp:spPr>
         <a:xfrm>
-          <a:off x="6560744" y="7245625"/>
-          <a:ext cx="1447168" cy="1447168"/>
+          <a:off x="5820327" y="7262016"/>
+          <a:ext cx="2855508" cy="1447168"/>
         </a:xfrm>
         <a:prstGeom prst="upArrow">
           <a:avLst/>
@@ -5676,8 +5676,8 @@
         </a:p>
       </dsp:txBody>
       <dsp:txXfrm>
-        <a:off x="6922536" y="7607417"/>
-        <a:ext cx="723584" cy="1085376"/>
+        <a:off x="6534204" y="7623808"/>
+        <a:ext cx="1427754" cy="1085376"/>
       </dsp:txXfrm>
     </dsp:sp>
     <dsp:sp modelId="{B25D85E1-2B83-41A7-B9A8-022ED1541DB7}">
@@ -5686,9 +5686,9 @@
         <dsp:cNvSpPr/>
       </dsp:nvSpPr>
       <dsp:spPr>
-        <a:xfrm rot="3150064">
-          <a:off x="7676840" y="9022694"/>
-          <a:ext cx="831648" cy="0"/>
+        <a:xfrm rot="3121703">
+          <a:off x="7655826" y="9030889"/>
+          <a:ext cx="816183" cy="0"/>
         </a:xfrm>
         <a:custGeom>
           <a:avLst/>
@@ -5702,7 +5702,7 @@
                 <a:pt x="0" y="0"/>
               </a:moveTo>
               <a:lnTo>
-                <a:pt x="831648" y="0"/>
+                <a:pt x="816183" y="0"/>
               </a:lnTo>
             </a:path>
           </a:pathLst>
@@ -5742,7 +5742,7 @@
       </dsp:nvSpPr>
       <dsp:spPr>
         <a:xfrm>
-          <a:off x="8177416" y="9352594"/>
+          <a:off x="8156170" y="9352594"/>
           <a:ext cx="1447168" cy="1447168"/>
         </a:xfrm>
         <a:prstGeom prst="roundRect">
@@ -5823,7 +5823,7 @@
         </a:p>
       </dsp:txBody>
       <dsp:txXfrm>
-        <a:off x="8248061" y="9423239"/>
+        <a:off x="8226815" y="9423239"/>
         <a:ext cx="1305878" cy="1305878"/>
       </dsp:txXfrm>
     </dsp:sp>
@@ -5833,9 +5833,9 @@
         <dsp:cNvSpPr/>
       </dsp:nvSpPr>
       <dsp:spPr>
-        <a:xfrm rot="7463535">
-          <a:off x="6108377" y="9051717"/>
-          <a:ext cx="869916" cy="0"/>
+        <a:xfrm rot="7490759">
+          <a:off x="6072779" y="9059912"/>
+          <a:ext cx="854713" cy="0"/>
         </a:xfrm>
         <a:custGeom>
           <a:avLst/>
@@ -5849,7 +5849,7 @@
                 <a:pt x="0" y="0"/>
               </a:moveTo>
               <a:lnTo>
-                <a:pt x="869916" y="0"/>
+                <a:pt x="854713" y="0"/>
               </a:lnTo>
             </a:path>
           </a:pathLst>
@@ -5889,7 +5889,7 @@
       </dsp:nvSpPr>
       <dsp:spPr>
         <a:xfrm>
-          <a:off x="5170259" y="9410640"/>
+          <a:off x="5120447" y="9410640"/>
           <a:ext cx="1303898" cy="1389122"/>
         </a:xfrm>
         <a:prstGeom prst="roundRect">
@@ -5976,7 +5976,7 @@
         </a:p>
       </dsp:txBody>
       <dsp:txXfrm>
-        <a:off x="5233910" y="9474291"/>
+        <a:off x="5184098" y="9474291"/>
         <a:ext cx="1176596" cy="1261820"/>
       </dsp:txXfrm>
     </dsp:sp>
@@ -5987,7 +5987,7 @@
       </dsp:nvSpPr>
       <dsp:spPr>
         <a:xfrm>
-          <a:off x="3253372" y="4898791"/>
+          <a:off x="3200358" y="4901674"/>
           <a:ext cx="2135152" cy="1002207"/>
         </a:xfrm>
         <a:prstGeom prst="rightArrow">
@@ -6067,7 +6067,7 @@
         </a:p>
       </dsp:txBody>
       <dsp:txXfrm>
-        <a:off x="3253372" y="5149343"/>
+        <a:off x="3200358" y="5152226"/>
         <a:ext cx="1884600" cy="501103"/>
       </dsp:txXfrm>
     </dsp:sp>
@@ -6077,9 +6077,9 @@
         <dsp:cNvSpPr/>
       </dsp:nvSpPr>
       <dsp:spPr>
-        <a:xfrm rot="9023601">
-          <a:off x="1734903" y="6351369"/>
-          <a:ext cx="1823202" cy="0"/>
+        <a:xfrm rot="8983219">
+          <a:off x="1731034" y="6358072"/>
+          <a:ext cx="1801553" cy="0"/>
         </a:xfrm>
         <a:custGeom>
           <a:avLst/>
@@ -6093,7 +6093,7 @@
                 <a:pt x="0" y="0"/>
               </a:moveTo>
               <a:lnTo>
-                <a:pt x="1823202" y="0"/>
+                <a:pt x="1801553" y="0"/>
               </a:lnTo>
             </a:path>
           </a:pathLst>
@@ -6133,7 +6133,7 @@
       </dsp:nvSpPr>
       <dsp:spPr>
         <a:xfrm>
-          <a:off x="0" y="6604884"/>
+          <a:off x="0" y="6629911"/>
           <a:ext cx="1853923" cy="1447168"/>
         </a:xfrm>
         <a:prstGeom prst="roundRect">
@@ -6223,7 +6223,7 @@
         </a:p>
       </dsp:txBody>
       <dsp:txXfrm>
-        <a:off x="70645" y="6675529"/>
+        <a:off x="70645" y="6700556"/>
         <a:ext cx="1712633" cy="1305878"/>
       </dsp:txXfrm>
     </dsp:sp>
@@ -6233,9 +6233,9 @@
         <dsp:cNvSpPr/>
       </dsp:nvSpPr>
       <dsp:spPr>
-        <a:xfrm rot="10800028">
-          <a:off x="2391706" y="5399883"/>
-          <a:ext cx="861666" cy="0"/>
+        <a:xfrm rot="10803321">
+          <a:off x="2143321" y="5401236"/>
+          <a:ext cx="1057037" cy="0"/>
         </a:xfrm>
         <a:custGeom>
           <a:avLst/>
@@ -6249,7 +6249,7 @@
                 <a:pt x="0" y="0"/>
               </a:moveTo>
               <a:lnTo>
-                <a:pt x="861666" y="0"/>
+                <a:pt x="1057037" y="0"/>
               </a:lnTo>
             </a:path>
           </a:pathLst>
@@ -6289,8 +6289,8 @@
       </dsp:nvSpPr>
       <dsp:spPr>
         <a:xfrm>
-          <a:off x="616595" y="4676288"/>
-          <a:ext cx="1775111" cy="1447168"/>
+          <a:off x="368210" y="5062598"/>
+          <a:ext cx="1775111" cy="674539"/>
         </a:xfrm>
         <a:prstGeom prst="roundRect">
           <a:avLst/>
@@ -6360,8 +6360,8 @@
         </a:p>
       </dsp:txBody>
       <dsp:txXfrm>
-        <a:off x="687240" y="4746933"/>
-        <a:ext cx="1633821" cy="1305878"/>
+        <a:off x="401138" y="5095526"/>
+        <a:ext cx="1709255" cy="608683"/>
       </dsp:txXfrm>
     </dsp:sp>
     <dsp:sp modelId="{F236F626-7564-4D7B-A924-B17B3793D78A}">
@@ -6370,9 +6370,9 @@
         <dsp:cNvSpPr/>
       </dsp:nvSpPr>
       <dsp:spPr>
-        <a:xfrm rot="12897405">
-          <a:off x="1296058" y="4172011"/>
-          <a:ext cx="2536940" cy="0"/>
+        <a:xfrm rot="12941385">
+          <a:off x="1270312" y="4161237"/>
+          <a:ext cx="2538366" cy="0"/>
         </a:xfrm>
         <a:custGeom>
           <a:avLst/>
@@ -6386,7 +6386,7 @@
                 <a:pt x="0" y="0"/>
               </a:moveTo>
               <a:lnTo>
-                <a:pt x="2536940" y="0"/>
+                <a:pt x="2538366" y="0"/>
               </a:lnTo>
             </a:path>
           </a:pathLst>
@@ -6426,7 +6426,7 @@
       </dsp:nvSpPr>
       <dsp:spPr>
         <a:xfrm>
-          <a:off x="0" y="2597162"/>
+          <a:off x="0" y="2572731"/>
           <a:ext cx="1836702" cy="848069"/>
         </a:xfrm>
         <a:prstGeom prst="roundRect">
@@ -6505,7 +6505,7 @@
         </a:p>
       </dsp:txBody>
       <dsp:txXfrm>
-        <a:off x="41399" y="2638561"/>
+        <a:off x="41399" y="2614130"/>
         <a:ext cx="1753904" cy="765271"/>
       </dsp:txXfrm>
     </dsp:sp>
@@ -17029,7 +17029,7 @@
           <a:p>
             <a:fld id="{53384975-D353-46D8-90C1-9CCC05EFAAC5}" type="datetimeFigureOut">
               <a:rPr lang="de-DE" smtClean="0"/>
-              <a:t>15.03.2018</a:t>
+              <a:t>18.04.2018</a:t>
             </a:fld>
             <a:endParaRPr lang="de-DE"/>
           </a:p>
@@ -17199,7 +17199,7 @@
           <a:p>
             <a:fld id="{53384975-D353-46D8-90C1-9CCC05EFAAC5}" type="datetimeFigureOut">
               <a:rPr lang="de-DE" smtClean="0"/>
-              <a:t>15.03.2018</a:t>
+              <a:t>18.04.2018</a:t>
             </a:fld>
             <a:endParaRPr lang="de-DE"/>
           </a:p>
@@ -17379,7 +17379,7 @@
           <a:p>
             <a:fld id="{53384975-D353-46D8-90C1-9CCC05EFAAC5}" type="datetimeFigureOut">
               <a:rPr lang="de-DE" smtClean="0"/>
-              <a:t>15.03.2018</a:t>
+              <a:t>18.04.2018</a:t>
             </a:fld>
             <a:endParaRPr lang="de-DE"/>
           </a:p>
@@ -17549,7 +17549,7 @@
           <a:p>
             <a:fld id="{53384975-D353-46D8-90C1-9CCC05EFAAC5}" type="datetimeFigureOut">
               <a:rPr lang="de-DE" smtClean="0"/>
-              <a:t>15.03.2018</a:t>
+              <a:t>18.04.2018</a:t>
             </a:fld>
             <a:endParaRPr lang="de-DE"/>
           </a:p>
@@ -17793,7 +17793,7 @@
           <a:p>
             <a:fld id="{53384975-D353-46D8-90C1-9CCC05EFAAC5}" type="datetimeFigureOut">
               <a:rPr lang="de-DE" smtClean="0"/>
-              <a:t>15.03.2018</a:t>
+              <a:t>18.04.2018</a:t>
             </a:fld>
             <a:endParaRPr lang="de-DE"/>
           </a:p>
@@ -18025,7 +18025,7 @@
           <a:p>
             <a:fld id="{53384975-D353-46D8-90C1-9CCC05EFAAC5}" type="datetimeFigureOut">
               <a:rPr lang="de-DE" smtClean="0"/>
-              <a:t>15.03.2018</a:t>
+              <a:t>18.04.2018</a:t>
             </a:fld>
             <a:endParaRPr lang="de-DE"/>
           </a:p>
@@ -18392,7 +18392,7 @@
           <a:p>
             <a:fld id="{53384975-D353-46D8-90C1-9CCC05EFAAC5}" type="datetimeFigureOut">
               <a:rPr lang="de-DE" smtClean="0"/>
-              <a:t>15.03.2018</a:t>
+              <a:t>18.04.2018</a:t>
             </a:fld>
             <a:endParaRPr lang="de-DE"/>
           </a:p>
@@ -18510,7 +18510,7 @@
           <a:p>
             <a:fld id="{53384975-D353-46D8-90C1-9CCC05EFAAC5}" type="datetimeFigureOut">
               <a:rPr lang="de-DE" smtClean="0"/>
-              <a:t>15.03.2018</a:t>
+              <a:t>18.04.2018</a:t>
             </a:fld>
             <a:endParaRPr lang="de-DE"/>
           </a:p>
@@ -18605,7 +18605,7 @@
           <a:p>
             <a:fld id="{53384975-D353-46D8-90C1-9CCC05EFAAC5}" type="datetimeFigureOut">
               <a:rPr lang="de-DE" smtClean="0"/>
-              <a:t>15.03.2018</a:t>
+              <a:t>18.04.2018</a:t>
             </a:fld>
             <a:endParaRPr lang="de-DE"/>
           </a:p>
@@ -18882,7 +18882,7 @@
           <a:p>
             <a:fld id="{53384975-D353-46D8-90C1-9CCC05EFAAC5}" type="datetimeFigureOut">
               <a:rPr lang="de-DE" smtClean="0"/>
-              <a:t>15.03.2018</a:t>
+              <a:t>18.04.2018</a:t>
             </a:fld>
             <a:endParaRPr lang="de-DE"/>
           </a:p>
@@ -19139,7 +19139,7 @@
           <a:p>
             <a:fld id="{53384975-D353-46D8-90C1-9CCC05EFAAC5}" type="datetimeFigureOut">
               <a:rPr lang="de-DE" smtClean="0"/>
-              <a:t>15.03.2018</a:t>
+              <a:t>18.04.2018</a:t>
             </a:fld>
             <a:endParaRPr lang="de-DE"/>
           </a:p>
@@ -19352,7 +19352,7 @@
           <a:p>
             <a:fld id="{53384975-D353-46D8-90C1-9CCC05EFAAC5}" type="datetimeFigureOut">
               <a:rPr lang="de-DE" smtClean="0"/>
-              <a:t>15.03.2018</a:t>
+              <a:t>18.04.2018</a:t>
             </a:fld>
             <a:endParaRPr lang="de-DE"/>
           </a:p>
@@ -19770,7 +19770,7 @@
           <p:nvPr>
             <p:extLst>
               <p:ext uri="{D42A27DB-BD31-4B8C-83A1-F6EECF244321}">
-                <p14:modId xmlns:p14="http://schemas.microsoft.com/office/powerpoint/2010/main" val="35207587"/>
+                <p14:modId xmlns:p14="http://schemas.microsoft.com/office/powerpoint/2010/main" val="2109273737"/>
               </p:ext>
             </p:extLst>
           </p:nvPr>

</xml_diff>

<commit_message>
weiter im TODO. Links repariert
Signed-off-by: Mirko <MightyMirko@users.noreply.github.com>
</commit_message>
<xml_diff>
--- a/data/180307_blackbox.pptx
+++ b/data/180307_blackbox.pptx
@@ -6,10 +6,10 @@
   </p:sldMasterIdLst>
   <p:sldIdLst>
     <p:sldId id="259" r:id="rId2"/>
-    <p:sldId id="260" r:id="rId3"/>
-    <p:sldId id="261" r:id="rId4"/>
-    <p:sldId id="257" r:id="rId5"/>
-    <p:sldId id="258" r:id="rId6"/>
+    <p:sldId id="257" r:id="rId3"/>
+    <p:sldId id="258" r:id="rId4"/>
+    <p:sldId id="260" r:id="rId5"/>
+    <p:sldId id="261" r:id="rId6"/>
     <p:sldId id="256" r:id="rId7"/>
   </p:sldIdLst>
   <p:sldSz cx="14400213" cy="10799763"/>
@@ -3063,7 +3063,7 @@
       <dgm:spPr/>
     </dgm:pt>
     <dgm:pt modelId="{432BAD03-D4F2-4816-A5DD-008918EE700F}" type="pres">
-      <dgm:prSet presAssocID="{862B70E5-C1DF-48E2-9C72-A539B53F8664}" presName="text4" presStyleLbl="node1" presStyleIdx="12" presStyleCnt="14" custScaleX="122661" custScaleY="46611" custRadScaleRad="165022" custRadScaleInc="-3509">
+      <dgm:prSet presAssocID="{862B70E5-C1DF-48E2-9C72-A539B53F8664}" presName="text4" presStyleLbl="node1" presStyleIdx="12" presStyleCnt="14" custScaleX="122661" custScaleY="46611" custRadScaleRad="181235" custRadScaleInc="-3195">
         <dgm:presLayoutVars>
           <dgm:bulletEnabled val="1"/>
         </dgm:presLayoutVars>
@@ -6233,9 +6233,9 @@
         <dsp:cNvSpPr/>
       </dsp:nvSpPr>
       <dsp:spPr>
-        <a:xfrm rot="10803321">
-          <a:off x="2143321" y="5401236"/>
-          <a:ext cx="1057037" cy="0"/>
+        <a:xfrm rot="10802996">
+          <a:off x="1818784" y="5401245"/>
+          <a:ext cx="1381574" cy="0"/>
         </a:xfrm>
         <a:custGeom>
           <a:avLst/>
@@ -6249,7 +6249,7 @@
                 <a:pt x="0" y="0"/>
               </a:moveTo>
               <a:lnTo>
-                <a:pt x="1057037" y="0"/>
+                <a:pt x="1381574" y="0"/>
               </a:lnTo>
             </a:path>
           </a:pathLst>
@@ -6289,7 +6289,7 @@
       </dsp:nvSpPr>
       <dsp:spPr>
         <a:xfrm>
-          <a:off x="368210" y="5062598"/>
+          <a:off x="43673" y="5062599"/>
           <a:ext cx="1775111" cy="674539"/>
         </a:xfrm>
         <a:prstGeom prst="roundRect">
@@ -6360,7 +6360,7 @@
         </a:p>
       </dsp:txBody>
       <dsp:txXfrm>
-        <a:off x="401138" y="5095526"/>
+        <a:off x="76601" y="5095527"/>
         <a:ext cx="1709255" cy="608683"/>
       </dsp:txXfrm>
     </dsp:sp>
@@ -19770,7 +19770,7 @@
           <p:nvPr>
             <p:extLst>
               <p:ext uri="{D42A27DB-BD31-4B8C-83A1-F6EECF244321}">
-                <p14:modId xmlns:p14="http://schemas.microsoft.com/office/powerpoint/2010/main" val="2109273737"/>
+                <p14:modId xmlns:p14="http://schemas.microsoft.com/office/powerpoint/2010/main" val="1869097596"/>
               </p:ext>
             </p:extLst>
           </p:nvPr>
@@ -19963,594 +19963,6 @@
 </file>
 
 <file path=ppt/slides/slide2.xml><?xml version="1.0" encoding="utf-8"?>
-<p:sld xmlns:a="http://schemas.openxmlformats.org/drawingml/2006/main" xmlns:r="http://schemas.openxmlformats.org/officeDocument/2006/relationships" xmlns:p="http://schemas.openxmlformats.org/presentationml/2006/main">
-  <p:cSld>
-    <p:spTree>
-      <p:nvGrpSpPr>
-        <p:cNvPr id="1" name=""/>
-        <p:cNvGrpSpPr/>
-        <p:nvPr/>
-      </p:nvGrpSpPr>
-      <p:grpSpPr>
-        <a:xfrm>
-          <a:off x="0" y="0"/>
-          <a:ext cx="0" cy="0"/>
-          <a:chOff x="0" y="0"/>
-          <a:chExt cx="0" cy="0"/>
-        </a:xfrm>
-      </p:grpSpPr>
-      <p:sp>
-        <p:nvSpPr>
-          <p:cNvPr id="171" name="Rechteck 170">
-            <a:extLst>
-              <a:ext uri="{FF2B5EF4-FFF2-40B4-BE49-F238E27FC236}">
-                <a16:creationId xmlns:a16="http://schemas.microsoft.com/office/drawing/2014/main" id="{6DE85F54-E4D0-48E6-A128-D002763D884B}"/>
-              </a:ext>
-            </a:extLst>
-          </p:cNvPr>
-          <p:cNvSpPr/>
-          <p:nvPr/>
-        </p:nvSpPr>
-        <p:spPr>
-          <a:xfrm rot="16200000">
-            <a:off x="4976098" y="2574394"/>
-            <a:ext cx="3578983" cy="5650974"/>
-          </a:xfrm>
-          <a:prstGeom prst="rect">
-            <a:avLst/>
-          </a:prstGeom>
-        </p:spPr>
-        <p:style>
-          <a:lnRef idx="2">
-            <a:schemeClr val="accent2">
-              <a:shade val="50000"/>
-            </a:schemeClr>
-          </a:lnRef>
-          <a:fillRef idx="1">
-            <a:schemeClr val="accent2"/>
-          </a:fillRef>
-          <a:effectRef idx="0">
-            <a:schemeClr val="accent2"/>
-          </a:effectRef>
-          <a:fontRef idx="minor">
-            <a:schemeClr val="lt1"/>
-          </a:fontRef>
-        </p:style>
-        <p:txBody>
-          <a:bodyPr rot="0" spcFirstLastPara="0" vertOverflow="overflow" horzOverflow="overflow" vert="vert" wrap="square" lIns="96012" tIns="48006" rIns="96012" bIns="48006" numCol="1" spcCol="0" rtlCol="0" fromWordArt="0" anchor="ctr" anchorCtr="0" forceAA="0" compatLnSpc="1">
-            <a:prstTxWarp prst="textNoShape">
-              <a:avLst/>
-            </a:prstTxWarp>
-            <a:noAutofit/>
-          </a:bodyPr>
-          <a:lstStyle/>
-          <a:p>
-            <a:pPr algn="ctr"/>
-            <a:r>
-              <a:rPr lang="de-DE" sz="6600" dirty="0"/>
-              <a:t>NOT AUS</a:t>
-            </a:r>
-            <a:endParaRPr lang="de-DE" sz="2940" dirty="0"/>
-          </a:p>
-        </p:txBody>
-      </p:sp>
-      <p:cxnSp>
-        <p:nvCxnSpPr>
-          <p:cNvPr id="3" name="Gerader Verbinder 2">
-            <a:extLst>
-              <a:ext uri="{FF2B5EF4-FFF2-40B4-BE49-F238E27FC236}">
-                <a16:creationId xmlns:a16="http://schemas.microsoft.com/office/drawing/2014/main" id="{B90A6B4E-9624-4699-B55E-C760FC36CAD7}"/>
-              </a:ext>
-            </a:extLst>
-          </p:cNvPr>
-          <p:cNvCxnSpPr>
-            <a:cxnSpLocks/>
-          </p:cNvCxnSpPr>
-          <p:nvPr/>
-        </p:nvCxnSpPr>
-        <p:spPr>
-          <a:xfrm>
-            <a:off x="566670" y="4365938"/>
-            <a:ext cx="3386311" cy="0"/>
-          </a:xfrm>
-          <a:prstGeom prst="line">
-            <a:avLst/>
-          </a:prstGeom>
-          <a:ln w="76200">
-            <a:solidFill>
-              <a:schemeClr val="accent2">
-                <a:lumMod val="50000"/>
-              </a:schemeClr>
-            </a:solidFill>
-          </a:ln>
-        </p:spPr>
-        <p:style>
-          <a:lnRef idx="1">
-            <a:schemeClr val="accent1"/>
-          </a:lnRef>
-          <a:fillRef idx="0">
-            <a:schemeClr val="accent1"/>
-          </a:fillRef>
-          <a:effectRef idx="0">
-            <a:schemeClr val="accent1"/>
-          </a:effectRef>
-          <a:fontRef idx="minor">
-            <a:schemeClr val="tx1"/>
-          </a:fontRef>
-        </p:style>
-      </p:cxnSp>
-      <p:cxnSp>
-        <p:nvCxnSpPr>
-          <p:cNvPr id="174" name="Gerader Verbinder 173">
-            <a:extLst>
-              <a:ext uri="{FF2B5EF4-FFF2-40B4-BE49-F238E27FC236}">
-                <a16:creationId xmlns:a16="http://schemas.microsoft.com/office/drawing/2014/main" id="{5D9A2BBD-AA89-4BE0-9283-C4FEAAB2612F}"/>
-              </a:ext>
-            </a:extLst>
-          </p:cNvPr>
-          <p:cNvCxnSpPr/>
-          <p:nvPr/>
-        </p:nvCxnSpPr>
-        <p:spPr>
-          <a:xfrm>
-            <a:off x="604474" y="6310648"/>
-            <a:ext cx="3348507" cy="0"/>
-          </a:xfrm>
-          <a:prstGeom prst="line">
-            <a:avLst/>
-          </a:prstGeom>
-          <a:ln w="76200"/>
-        </p:spPr>
-        <p:style>
-          <a:lnRef idx="1">
-            <a:schemeClr val="accent1"/>
-          </a:lnRef>
-          <a:fillRef idx="0">
-            <a:schemeClr val="accent1"/>
-          </a:fillRef>
-          <a:effectRef idx="0">
-            <a:schemeClr val="accent1"/>
-          </a:effectRef>
-          <a:fontRef idx="minor">
-            <a:schemeClr val="tx1"/>
-          </a:fontRef>
-        </p:style>
-      </p:cxnSp>
-      <p:cxnSp>
-        <p:nvCxnSpPr>
-          <p:cNvPr id="175" name="Gerader Verbinder 174">
-            <a:extLst>
-              <a:ext uri="{FF2B5EF4-FFF2-40B4-BE49-F238E27FC236}">
-                <a16:creationId xmlns:a16="http://schemas.microsoft.com/office/drawing/2014/main" id="{ED73430B-4CAB-45B5-962F-24CED9CF9B32}"/>
-              </a:ext>
-            </a:extLst>
-          </p:cNvPr>
-          <p:cNvCxnSpPr>
-            <a:cxnSpLocks/>
-          </p:cNvCxnSpPr>
-          <p:nvPr/>
-        </p:nvCxnSpPr>
-        <p:spPr>
-          <a:xfrm>
-            <a:off x="9603956" y="6439437"/>
-            <a:ext cx="3505904" cy="0"/>
-          </a:xfrm>
-          <a:prstGeom prst="line">
-            <a:avLst/>
-          </a:prstGeom>
-          <a:ln w="76200"/>
-        </p:spPr>
-        <p:style>
-          <a:lnRef idx="1">
-            <a:schemeClr val="accent1"/>
-          </a:lnRef>
-          <a:fillRef idx="0">
-            <a:schemeClr val="accent1"/>
-          </a:fillRef>
-          <a:effectRef idx="0">
-            <a:schemeClr val="accent1"/>
-          </a:effectRef>
-          <a:fontRef idx="minor">
-            <a:schemeClr val="tx1"/>
-          </a:fontRef>
-        </p:style>
-      </p:cxnSp>
-      <p:cxnSp>
-        <p:nvCxnSpPr>
-          <p:cNvPr id="178" name="Gerader Verbinder 177">
-            <a:extLst>
-              <a:ext uri="{FF2B5EF4-FFF2-40B4-BE49-F238E27FC236}">
-                <a16:creationId xmlns:a16="http://schemas.microsoft.com/office/drawing/2014/main" id="{6415ECF1-880D-450B-B4A3-AF40DB4EF6B8}"/>
-              </a:ext>
-            </a:extLst>
-          </p:cNvPr>
-          <p:cNvCxnSpPr/>
-          <p:nvPr/>
-        </p:nvCxnSpPr>
-        <p:spPr>
-          <a:xfrm>
-            <a:off x="9603956" y="4623516"/>
-            <a:ext cx="3348507" cy="0"/>
-          </a:xfrm>
-          <a:prstGeom prst="line">
-            <a:avLst/>
-          </a:prstGeom>
-          <a:ln w="76200">
-            <a:solidFill>
-              <a:schemeClr val="accent2">
-                <a:lumMod val="50000"/>
-              </a:schemeClr>
-            </a:solidFill>
-          </a:ln>
-        </p:spPr>
-        <p:style>
-          <a:lnRef idx="1">
-            <a:schemeClr val="accent1"/>
-          </a:lnRef>
-          <a:fillRef idx="0">
-            <a:schemeClr val="accent1"/>
-          </a:fillRef>
-          <a:effectRef idx="0">
-            <a:schemeClr val="accent1"/>
-          </a:effectRef>
-          <a:fontRef idx="minor">
-            <a:schemeClr val="tx1"/>
-          </a:fontRef>
-        </p:style>
-      </p:cxnSp>
-      <p:cxnSp>
-        <p:nvCxnSpPr>
-          <p:cNvPr id="180" name="Gerader Verbinder 179">
-            <a:extLst>
-              <a:ext uri="{FF2B5EF4-FFF2-40B4-BE49-F238E27FC236}">
-                <a16:creationId xmlns:a16="http://schemas.microsoft.com/office/drawing/2014/main" id="{8107A914-D89A-455C-82AC-DFFE247461F0}"/>
-              </a:ext>
-            </a:extLst>
-          </p:cNvPr>
-          <p:cNvCxnSpPr>
-            <a:cxnSpLocks/>
-          </p:cNvCxnSpPr>
-          <p:nvPr/>
-        </p:nvCxnSpPr>
-        <p:spPr>
-          <a:xfrm>
-            <a:off x="604474" y="8603087"/>
-            <a:ext cx="12489656" cy="0"/>
-          </a:xfrm>
-          <a:prstGeom prst="line">
-            <a:avLst/>
-          </a:prstGeom>
-          <a:ln w="76200">
-            <a:solidFill>
-              <a:schemeClr val="accent6">
-                <a:lumMod val="75000"/>
-              </a:schemeClr>
-            </a:solidFill>
-          </a:ln>
-        </p:spPr>
-        <p:style>
-          <a:lnRef idx="1">
-            <a:schemeClr val="accent1"/>
-          </a:lnRef>
-          <a:fillRef idx="0">
-            <a:schemeClr val="accent1"/>
-          </a:fillRef>
-          <a:effectRef idx="0">
-            <a:schemeClr val="accent1"/>
-          </a:effectRef>
-          <a:fontRef idx="minor">
-            <a:schemeClr val="tx1"/>
-          </a:fontRef>
-        </p:style>
-      </p:cxnSp>
-    </p:spTree>
-    <p:extLst>
-      <p:ext uri="{BB962C8B-B14F-4D97-AF65-F5344CB8AC3E}">
-        <p14:creationId xmlns:p14="http://schemas.microsoft.com/office/powerpoint/2010/main" val="3519320094"/>
-      </p:ext>
-    </p:extLst>
-  </p:cSld>
-  <p:clrMapOvr>
-    <a:masterClrMapping/>
-  </p:clrMapOvr>
-</p:sld>
-</file>
-
-<file path=ppt/slides/slide3.xml><?xml version="1.0" encoding="utf-8"?>
-<p:sld xmlns:a="http://schemas.openxmlformats.org/drawingml/2006/main" xmlns:r="http://schemas.openxmlformats.org/officeDocument/2006/relationships" xmlns:p="http://schemas.openxmlformats.org/presentationml/2006/main">
-  <p:cSld>
-    <p:spTree>
-      <p:nvGrpSpPr>
-        <p:cNvPr id="1" name=""/>
-        <p:cNvGrpSpPr/>
-        <p:nvPr/>
-      </p:nvGrpSpPr>
-      <p:grpSpPr>
-        <a:xfrm>
-          <a:off x="0" y="0"/>
-          <a:ext cx="0" cy="0"/>
-          <a:chOff x="0" y="0"/>
-          <a:chExt cx="0" cy="0"/>
-        </a:xfrm>
-      </p:grpSpPr>
-      <p:sp>
-        <p:nvSpPr>
-          <p:cNvPr id="171" name="Rechteck 170">
-            <a:extLst>
-              <a:ext uri="{FF2B5EF4-FFF2-40B4-BE49-F238E27FC236}">
-                <a16:creationId xmlns:a16="http://schemas.microsoft.com/office/drawing/2014/main" id="{6DE85F54-E4D0-48E6-A128-D002763D884B}"/>
-              </a:ext>
-            </a:extLst>
-          </p:cNvPr>
-          <p:cNvSpPr/>
-          <p:nvPr/>
-        </p:nvSpPr>
-        <p:spPr>
-          <a:xfrm rot="16200000">
-            <a:off x="4976098" y="2574394"/>
-            <a:ext cx="3578983" cy="5650974"/>
-          </a:xfrm>
-          <a:prstGeom prst="rect">
-            <a:avLst/>
-          </a:prstGeom>
-        </p:spPr>
-        <p:style>
-          <a:lnRef idx="2">
-            <a:schemeClr val="accent2">
-              <a:shade val="50000"/>
-            </a:schemeClr>
-          </a:lnRef>
-          <a:fillRef idx="1">
-            <a:schemeClr val="accent2"/>
-          </a:fillRef>
-          <a:effectRef idx="0">
-            <a:schemeClr val="accent2"/>
-          </a:effectRef>
-          <a:fontRef idx="minor">
-            <a:schemeClr val="lt1"/>
-          </a:fontRef>
-        </p:style>
-        <p:txBody>
-          <a:bodyPr rot="0" spcFirstLastPara="0" vertOverflow="overflow" horzOverflow="overflow" vert="vert" wrap="square" lIns="96012" tIns="48006" rIns="96012" bIns="48006" numCol="1" spcCol="0" rtlCol="0" fromWordArt="0" anchor="ctr" anchorCtr="0" forceAA="0" compatLnSpc="1">
-            <a:prstTxWarp prst="textNoShape">
-              <a:avLst/>
-            </a:prstTxWarp>
-            <a:noAutofit/>
-          </a:bodyPr>
-          <a:lstStyle/>
-          <a:p>
-            <a:pPr algn="ctr"/>
-            <a:r>
-              <a:rPr lang="de-DE" sz="6600" dirty="0"/>
-              <a:t>HAUPT SCHALTER</a:t>
-            </a:r>
-            <a:endParaRPr lang="de-DE" sz="2940" dirty="0"/>
-          </a:p>
-        </p:txBody>
-      </p:sp>
-      <p:cxnSp>
-        <p:nvCxnSpPr>
-          <p:cNvPr id="3" name="Gerader Verbinder 2">
-            <a:extLst>
-              <a:ext uri="{FF2B5EF4-FFF2-40B4-BE49-F238E27FC236}">
-                <a16:creationId xmlns:a16="http://schemas.microsoft.com/office/drawing/2014/main" id="{B90A6B4E-9624-4699-B55E-C760FC36CAD7}"/>
-              </a:ext>
-            </a:extLst>
-          </p:cNvPr>
-          <p:cNvCxnSpPr>
-            <a:cxnSpLocks/>
-          </p:cNvCxnSpPr>
-          <p:nvPr/>
-        </p:nvCxnSpPr>
-        <p:spPr>
-          <a:xfrm>
-            <a:off x="566670" y="4365938"/>
-            <a:ext cx="3386311" cy="0"/>
-          </a:xfrm>
-          <a:prstGeom prst="line">
-            <a:avLst/>
-          </a:prstGeom>
-          <a:ln w="76200">
-            <a:solidFill>
-              <a:schemeClr val="accent2">
-                <a:lumMod val="50000"/>
-              </a:schemeClr>
-            </a:solidFill>
-          </a:ln>
-        </p:spPr>
-        <p:style>
-          <a:lnRef idx="1">
-            <a:schemeClr val="accent1"/>
-          </a:lnRef>
-          <a:fillRef idx="0">
-            <a:schemeClr val="accent1"/>
-          </a:fillRef>
-          <a:effectRef idx="0">
-            <a:schemeClr val="accent1"/>
-          </a:effectRef>
-          <a:fontRef idx="minor">
-            <a:schemeClr val="tx1"/>
-          </a:fontRef>
-        </p:style>
-      </p:cxnSp>
-      <p:cxnSp>
-        <p:nvCxnSpPr>
-          <p:cNvPr id="174" name="Gerader Verbinder 173">
-            <a:extLst>
-              <a:ext uri="{FF2B5EF4-FFF2-40B4-BE49-F238E27FC236}">
-                <a16:creationId xmlns:a16="http://schemas.microsoft.com/office/drawing/2014/main" id="{5D9A2BBD-AA89-4BE0-9283-C4FEAAB2612F}"/>
-              </a:ext>
-            </a:extLst>
-          </p:cNvPr>
-          <p:cNvCxnSpPr/>
-          <p:nvPr/>
-        </p:nvCxnSpPr>
-        <p:spPr>
-          <a:xfrm>
-            <a:off x="604474" y="6310648"/>
-            <a:ext cx="3348507" cy="0"/>
-          </a:xfrm>
-          <a:prstGeom prst="line">
-            <a:avLst/>
-          </a:prstGeom>
-          <a:ln w="76200"/>
-        </p:spPr>
-        <p:style>
-          <a:lnRef idx="1">
-            <a:schemeClr val="accent1"/>
-          </a:lnRef>
-          <a:fillRef idx="0">
-            <a:schemeClr val="accent1"/>
-          </a:fillRef>
-          <a:effectRef idx="0">
-            <a:schemeClr val="accent1"/>
-          </a:effectRef>
-          <a:fontRef idx="minor">
-            <a:schemeClr val="tx1"/>
-          </a:fontRef>
-        </p:style>
-      </p:cxnSp>
-      <p:cxnSp>
-        <p:nvCxnSpPr>
-          <p:cNvPr id="175" name="Gerader Verbinder 174">
-            <a:extLst>
-              <a:ext uri="{FF2B5EF4-FFF2-40B4-BE49-F238E27FC236}">
-                <a16:creationId xmlns:a16="http://schemas.microsoft.com/office/drawing/2014/main" id="{ED73430B-4CAB-45B5-962F-24CED9CF9B32}"/>
-              </a:ext>
-            </a:extLst>
-          </p:cNvPr>
-          <p:cNvCxnSpPr>
-            <a:cxnSpLocks/>
-          </p:cNvCxnSpPr>
-          <p:nvPr/>
-        </p:nvCxnSpPr>
-        <p:spPr>
-          <a:xfrm>
-            <a:off x="9603956" y="6439437"/>
-            <a:ext cx="3505904" cy="0"/>
-          </a:xfrm>
-          <a:prstGeom prst="line">
-            <a:avLst/>
-          </a:prstGeom>
-          <a:ln w="76200"/>
-        </p:spPr>
-        <p:style>
-          <a:lnRef idx="1">
-            <a:schemeClr val="accent1"/>
-          </a:lnRef>
-          <a:fillRef idx="0">
-            <a:schemeClr val="accent1"/>
-          </a:fillRef>
-          <a:effectRef idx="0">
-            <a:schemeClr val="accent1"/>
-          </a:effectRef>
-          <a:fontRef idx="minor">
-            <a:schemeClr val="tx1"/>
-          </a:fontRef>
-        </p:style>
-      </p:cxnSp>
-      <p:cxnSp>
-        <p:nvCxnSpPr>
-          <p:cNvPr id="178" name="Gerader Verbinder 177">
-            <a:extLst>
-              <a:ext uri="{FF2B5EF4-FFF2-40B4-BE49-F238E27FC236}">
-                <a16:creationId xmlns:a16="http://schemas.microsoft.com/office/drawing/2014/main" id="{6415ECF1-880D-450B-B4A3-AF40DB4EF6B8}"/>
-              </a:ext>
-            </a:extLst>
-          </p:cNvPr>
-          <p:cNvCxnSpPr/>
-          <p:nvPr/>
-        </p:nvCxnSpPr>
-        <p:spPr>
-          <a:xfrm>
-            <a:off x="9603956" y="4623516"/>
-            <a:ext cx="3348507" cy="0"/>
-          </a:xfrm>
-          <a:prstGeom prst="line">
-            <a:avLst/>
-          </a:prstGeom>
-          <a:ln w="76200">
-            <a:solidFill>
-              <a:schemeClr val="accent2">
-                <a:lumMod val="50000"/>
-              </a:schemeClr>
-            </a:solidFill>
-          </a:ln>
-        </p:spPr>
-        <p:style>
-          <a:lnRef idx="1">
-            <a:schemeClr val="accent1"/>
-          </a:lnRef>
-          <a:fillRef idx="0">
-            <a:schemeClr val="accent1"/>
-          </a:fillRef>
-          <a:effectRef idx="0">
-            <a:schemeClr val="accent1"/>
-          </a:effectRef>
-          <a:fontRef idx="minor">
-            <a:schemeClr val="tx1"/>
-          </a:fontRef>
-        </p:style>
-      </p:cxnSp>
-      <p:cxnSp>
-        <p:nvCxnSpPr>
-          <p:cNvPr id="180" name="Gerader Verbinder 179">
-            <a:extLst>
-              <a:ext uri="{FF2B5EF4-FFF2-40B4-BE49-F238E27FC236}">
-                <a16:creationId xmlns:a16="http://schemas.microsoft.com/office/drawing/2014/main" id="{8107A914-D89A-455C-82AC-DFFE247461F0}"/>
-              </a:ext>
-            </a:extLst>
-          </p:cNvPr>
-          <p:cNvCxnSpPr>
-            <a:cxnSpLocks/>
-          </p:cNvCxnSpPr>
-          <p:nvPr/>
-        </p:nvCxnSpPr>
-        <p:spPr>
-          <a:xfrm>
-            <a:off x="604474" y="8603087"/>
-            <a:ext cx="12489656" cy="0"/>
-          </a:xfrm>
-          <a:prstGeom prst="line">
-            <a:avLst/>
-          </a:prstGeom>
-          <a:ln w="76200">
-            <a:solidFill>
-              <a:schemeClr val="accent6">
-                <a:lumMod val="75000"/>
-              </a:schemeClr>
-            </a:solidFill>
-          </a:ln>
-        </p:spPr>
-        <p:style>
-          <a:lnRef idx="1">
-            <a:schemeClr val="accent1"/>
-          </a:lnRef>
-          <a:fillRef idx="0">
-            <a:schemeClr val="accent1"/>
-          </a:fillRef>
-          <a:effectRef idx="0">
-            <a:schemeClr val="accent1"/>
-          </a:effectRef>
-          <a:fontRef idx="minor">
-            <a:schemeClr val="tx1"/>
-          </a:fontRef>
-        </p:style>
-      </p:cxnSp>
-    </p:spTree>
-    <p:extLst>
-      <p:ext uri="{BB962C8B-B14F-4D97-AF65-F5344CB8AC3E}">
-        <p14:creationId xmlns:p14="http://schemas.microsoft.com/office/powerpoint/2010/main" val="3644932846"/>
-      </p:ext>
-    </p:extLst>
-  </p:cSld>
-  <p:clrMapOvr>
-    <a:masterClrMapping/>
-  </p:clrMapOvr>
-</p:sld>
-</file>
-
-<file path=ppt/slides/slide4.xml><?xml version="1.0" encoding="utf-8"?>
 <p:sld xmlns:a="http://schemas.openxmlformats.org/drawingml/2006/main" xmlns:r="http://schemas.openxmlformats.org/officeDocument/2006/relationships" xmlns:p="http://schemas.openxmlformats.org/presentationml/2006/main">
   <p:cSld>
     <p:spTree>
@@ -28958,7 +28370,7 @@
 </p:sld>
 </file>
 
-<file path=ppt/slides/slide5.xml><?xml version="1.0" encoding="utf-8"?>
+<file path=ppt/slides/slide3.xml><?xml version="1.0" encoding="utf-8"?>
 <p:sld xmlns:a="http://schemas.openxmlformats.org/drawingml/2006/main" xmlns:r="http://schemas.openxmlformats.org/officeDocument/2006/relationships" xmlns:p="http://schemas.openxmlformats.org/presentationml/2006/main">
   <p:cSld>
     <p:spTree>
@@ -29563,6 +28975,594 @@
 </p:sld>
 </file>
 
+<file path=ppt/slides/slide4.xml><?xml version="1.0" encoding="utf-8"?>
+<p:sld xmlns:a="http://schemas.openxmlformats.org/drawingml/2006/main" xmlns:r="http://schemas.openxmlformats.org/officeDocument/2006/relationships" xmlns:p="http://schemas.openxmlformats.org/presentationml/2006/main">
+  <p:cSld>
+    <p:spTree>
+      <p:nvGrpSpPr>
+        <p:cNvPr id="1" name=""/>
+        <p:cNvGrpSpPr/>
+        <p:nvPr/>
+      </p:nvGrpSpPr>
+      <p:grpSpPr>
+        <a:xfrm>
+          <a:off x="0" y="0"/>
+          <a:ext cx="0" cy="0"/>
+          <a:chOff x="0" y="0"/>
+          <a:chExt cx="0" cy="0"/>
+        </a:xfrm>
+      </p:grpSpPr>
+      <p:sp>
+        <p:nvSpPr>
+          <p:cNvPr id="171" name="Rechteck 170">
+            <a:extLst>
+              <a:ext uri="{FF2B5EF4-FFF2-40B4-BE49-F238E27FC236}">
+                <a16:creationId xmlns:a16="http://schemas.microsoft.com/office/drawing/2014/main" id="{6DE85F54-E4D0-48E6-A128-D002763D884B}"/>
+              </a:ext>
+            </a:extLst>
+          </p:cNvPr>
+          <p:cNvSpPr/>
+          <p:nvPr/>
+        </p:nvSpPr>
+        <p:spPr>
+          <a:xfrm rot="16200000">
+            <a:off x="4976098" y="2574394"/>
+            <a:ext cx="3578983" cy="5650974"/>
+          </a:xfrm>
+          <a:prstGeom prst="rect">
+            <a:avLst/>
+          </a:prstGeom>
+        </p:spPr>
+        <p:style>
+          <a:lnRef idx="2">
+            <a:schemeClr val="accent2">
+              <a:shade val="50000"/>
+            </a:schemeClr>
+          </a:lnRef>
+          <a:fillRef idx="1">
+            <a:schemeClr val="accent2"/>
+          </a:fillRef>
+          <a:effectRef idx="0">
+            <a:schemeClr val="accent2"/>
+          </a:effectRef>
+          <a:fontRef idx="minor">
+            <a:schemeClr val="lt1"/>
+          </a:fontRef>
+        </p:style>
+        <p:txBody>
+          <a:bodyPr rot="0" spcFirstLastPara="0" vertOverflow="overflow" horzOverflow="overflow" vert="vert" wrap="square" lIns="96012" tIns="48006" rIns="96012" bIns="48006" numCol="1" spcCol="0" rtlCol="0" fromWordArt="0" anchor="ctr" anchorCtr="0" forceAA="0" compatLnSpc="1">
+            <a:prstTxWarp prst="textNoShape">
+              <a:avLst/>
+            </a:prstTxWarp>
+            <a:noAutofit/>
+          </a:bodyPr>
+          <a:lstStyle/>
+          <a:p>
+            <a:pPr algn="ctr"/>
+            <a:r>
+              <a:rPr lang="de-DE" sz="6600" dirty="0"/>
+              <a:t>NOT AUS</a:t>
+            </a:r>
+            <a:endParaRPr lang="de-DE" sz="2940" dirty="0"/>
+          </a:p>
+        </p:txBody>
+      </p:sp>
+      <p:cxnSp>
+        <p:nvCxnSpPr>
+          <p:cNvPr id="3" name="Gerader Verbinder 2">
+            <a:extLst>
+              <a:ext uri="{FF2B5EF4-FFF2-40B4-BE49-F238E27FC236}">
+                <a16:creationId xmlns:a16="http://schemas.microsoft.com/office/drawing/2014/main" id="{B90A6B4E-9624-4699-B55E-C760FC36CAD7}"/>
+              </a:ext>
+            </a:extLst>
+          </p:cNvPr>
+          <p:cNvCxnSpPr>
+            <a:cxnSpLocks/>
+          </p:cNvCxnSpPr>
+          <p:nvPr/>
+        </p:nvCxnSpPr>
+        <p:spPr>
+          <a:xfrm>
+            <a:off x="566670" y="4365938"/>
+            <a:ext cx="3386311" cy="0"/>
+          </a:xfrm>
+          <a:prstGeom prst="line">
+            <a:avLst/>
+          </a:prstGeom>
+          <a:ln w="76200">
+            <a:solidFill>
+              <a:schemeClr val="accent2">
+                <a:lumMod val="50000"/>
+              </a:schemeClr>
+            </a:solidFill>
+          </a:ln>
+        </p:spPr>
+        <p:style>
+          <a:lnRef idx="1">
+            <a:schemeClr val="accent1"/>
+          </a:lnRef>
+          <a:fillRef idx="0">
+            <a:schemeClr val="accent1"/>
+          </a:fillRef>
+          <a:effectRef idx="0">
+            <a:schemeClr val="accent1"/>
+          </a:effectRef>
+          <a:fontRef idx="minor">
+            <a:schemeClr val="tx1"/>
+          </a:fontRef>
+        </p:style>
+      </p:cxnSp>
+      <p:cxnSp>
+        <p:nvCxnSpPr>
+          <p:cNvPr id="174" name="Gerader Verbinder 173">
+            <a:extLst>
+              <a:ext uri="{FF2B5EF4-FFF2-40B4-BE49-F238E27FC236}">
+                <a16:creationId xmlns:a16="http://schemas.microsoft.com/office/drawing/2014/main" id="{5D9A2BBD-AA89-4BE0-9283-C4FEAAB2612F}"/>
+              </a:ext>
+            </a:extLst>
+          </p:cNvPr>
+          <p:cNvCxnSpPr/>
+          <p:nvPr/>
+        </p:nvCxnSpPr>
+        <p:spPr>
+          <a:xfrm>
+            <a:off x="604474" y="6310648"/>
+            <a:ext cx="3348507" cy="0"/>
+          </a:xfrm>
+          <a:prstGeom prst="line">
+            <a:avLst/>
+          </a:prstGeom>
+          <a:ln w="76200"/>
+        </p:spPr>
+        <p:style>
+          <a:lnRef idx="1">
+            <a:schemeClr val="accent1"/>
+          </a:lnRef>
+          <a:fillRef idx="0">
+            <a:schemeClr val="accent1"/>
+          </a:fillRef>
+          <a:effectRef idx="0">
+            <a:schemeClr val="accent1"/>
+          </a:effectRef>
+          <a:fontRef idx="minor">
+            <a:schemeClr val="tx1"/>
+          </a:fontRef>
+        </p:style>
+      </p:cxnSp>
+      <p:cxnSp>
+        <p:nvCxnSpPr>
+          <p:cNvPr id="175" name="Gerader Verbinder 174">
+            <a:extLst>
+              <a:ext uri="{FF2B5EF4-FFF2-40B4-BE49-F238E27FC236}">
+                <a16:creationId xmlns:a16="http://schemas.microsoft.com/office/drawing/2014/main" id="{ED73430B-4CAB-45B5-962F-24CED9CF9B32}"/>
+              </a:ext>
+            </a:extLst>
+          </p:cNvPr>
+          <p:cNvCxnSpPr>
+            <a:cxnSpLocks/>
+          </p:cNvCxnSpPr>
+          <p:nvPr/>
+        </p:nvCxnSpPr>
+        <p:spPr>
+          <a:xfrm>
+            <a:off x="9603956" y="6439437"/>
+            <a:ext cx="3505904" cy="0"/>
+          </a:xfrm>
+          <a:prstGeom prst="line">
+            <a:avLst/>
+          </a:prstGeom>
+          <a:ln w="76200"/>
+        </p:spPr>
+        <p:style>
+          <a:lnRef idx="1">
+            <a:schemeClr val="accent1"/>
+          </a:lnRef>
+          <a:fillRef idx="0">
+            <a:schemeClr val="accent1"/>
+          </a:fillRef>
+          <a:effectRef idx="0">
+            <a:schemeClr val="accent1"/>
+          </a:effectRef>
+          <a:fontRef idx="minor">
+            <a:schemeClr val="tx1"/>
+          </a:fontRef>
+        </p:style>
+      </p:cxnSp>
+      <p:cxnSp>
+        <p:nvCxnSpPr>
+          <p:cNvPr id="178" name="Gerader Verbinder 177">
+            <a:extLst>
+              <a:ext uri="{FF2B5EF4-FFF2-40B4-BE49-F238E27FC236}">
+                <a16:creationId xmlns:a16="http://schemas.microsoft.com/office/drawing/2014/main" id="{6415ECF1-880D-450B-B4A3-AF40DB4EF6B8}"/>
+              </a:ext>
+            </a:extLst>
+          </p:cNvPr>
+          <p:cNvCxnSpPr/>
+          <p:nvPr/>
+        </p:nvCxnSpPr>
+        <p:spPr>
+          <a:xfrm>
+            <a:off x="9603956" y="4623516"/>
+            <a:ext cx="3348507" cy="0"/>
+          </a:xfrm>
+          <a:prstGeom prst="line">
+            <a:avLst/>
+          </a:prstGeom>
+          <a:ln w="76200">
+            <a:solidFill>
+              <a:schemeClr val="accent2">
+                <a:lumMod val="50000"/>
+              </a:schemeClr>
+            </a:solidFill>
+          </a:ln>
+        </p:spPr>
+        <p:style>
+          <a:lnRef idx="1">
+            <a:schemeClr val="accent1"/>
+          </a:lnRef>
+          <a:fillRef idx="0">
+            <a:schemeClr val="accent1"/>
+          </a:fillRef>
+          <a:effectRef idx="0">
+            <a:schemeClr val="accent1"/>
+          </a:effectRef>
+          <a:fontRef idx="minor">
+            <a:schemeClr val="tx1"/>
+          </a:fontRef>
+        </p:style>
+      </p:cxnSp>
+      <p:cxnSp>
+        <p:nvCxnSpPr>
+          <p:cNvPr id="180" name="Gerader Verbinder 179">
+            <a:extLst>
+              <a:ext uri="{FF2B5EF4-FFF2-40B4-BE49-F238E27FC236}">
+                <a16:creationId xmlns:a16="http://schemas.microsoft.com/office/drawing/2014/main" id="{8107A914-D89A-455C-82AC-DFFE247461F0}"/>
+              </a:ext>
+            </a:extLst>
+          </p:cNvPr>
+          <p:cNvCxnSpPr>
+            <a:cxnSpLocks/>
+          </p:cNvCxnSpPr>
+          <p:nvPr/>
+        </p:nvCxnSpPr>
+        <p:spPr>
+          <a:xfrm>
+            <a:off x="604474" y="8603087"/>
+            <a:ext cx="12489656" cy="0"/>
+          </a:xfrm>
+          <a:prstGeom prst="line">
+            <a:avLst/>
+          </a:prstGeom>
+          <a:ln w="76200">
+            <a:solidFill>
+              <a:schemeClr val="accent6">
+                <a:lumMod val="75000"/>
+              </a:schemeClr>
+            </a:solidFill>
+          </a:ln>
+        </p:spPr>
+        <p:style>
+          <a:lnRef idx="1">
+            <a:schemeClr val="accent1"/>
+          </a:lnRef>
+          <a:fillRef idx="0">
+            <a:schemeClr val="accent1"/>
+          </a:fillRef>
+          <a:effectRef idx="0">
+            <a:schemeClr val="accent1"/>
+          </a:effectRef>
+          <a:fontRef idx="minor">
+            <a:schemeClr val="tx1"/>
+          </a:fontRef>
+        </p:style>
+      </p:cxnSp>
+    </p:spTree>
+    <p:extLst>
+      <p:ext uri="{BB962C8B-B14F-4D97-AF65-F5344CB8AC3E}">
+        <p14:creationId xmlns:p14="http://schemas.microsoft.com/office/powerpoint/2010/main" val="3519320094"/>
+      </p:ext>
+    </p:extLst>
+  </p:cSld>
+  <p:clrMapOvr>
+    <a:masterClrMapping/>
+  </p:clrMapOvr>
+</p:sld>
+</file>
+
+<file path=ppt/slides/slide5.xml><?xml version="1.0" encoding="utf-8"?>
+<p:sld xmlns:a="http://schemas.openxmlformats.org/drawingml/2006/main" xmlns:r="http://schemas.openxmlformats.org/officeDocument/2006/relationships" xmlns:p="http://schemas.openxmlformats.org/presentationml/2006/main">
+  <p:cSld>
+    <p:spTree>
+      <p:nvGrpSpPr>
+        <p:cNvPr id="1" name=""/>
+        <p:cNvGrpSpPr/>
+        <p:nvPr/>
+      </p:nvGrpSpPr>
+      <p:grpSpPr>
+        <a:xfrm>
+          <a:off x="0" y="0"/>
+          <a:ext cx="0" cy="0"/>
+          <a:chOff x="0" y="0"/>
+          <a:chExt cx="0" cy="0"/>
+        </a:xfrm>
+      </p:grpSpPr>
+      <p:sp>
+        <p:nvSpPr>
+          <p:cNvPr id="171" name="Rechteck 170">
+            <a:extLst>
+              <a:ext uri="{FF2B5EF4-FFF2-40B4-BE49-F238E27FC236}">
+                <a16:creationId xmlns:a16="http://schemas.microsoft.com/office/drawing/2014/main" id="{6DE85F54-E4D0-48E6-A128-D002763D884B}"/>
+              </a:ext>
+            </a:extLst>
+          </p:cNvPr>
+          <p:cNvSpPr/>
+          <p:nvPr/>
+        </p:nvSpPr>
+        <p:spPr>
+          <a:xfrm rot="16200000">
+            <a:off x="4976098" y="2574394"/>
+            <a:ext cx="3578983" cy="5650974"/>
+          </a:xfrm>
+          <a:prstGeom prst="rect">
+            <a:avLst/>
+          </a:prstGeom>
+        </p:spPr>
+        <p:style>
+          <a:lnRef idx="2">
+            <a:schemeClr val="accent2">
+              <a:shade val="50000"/>
+            </a:schemeClr>
+          </a:lnRef>
+          <a:fillRef idx="1">
+            <a:schemeClr val="accent2"/>
+          </a:fillRef>
+          <a:effectRef idx="0">
+            <a:schemeClr val="accent2"/>
+          </a:effectRef>
+          <a:fontRef idx="minor">
+            <a:schemeClr val="lt1"/>
+          </a:fontRef>
+        </p:style>
+        <p:txBody>
+          <a:bodyPr rot="0" spcFirstLastPara="0" vertOverflow="overflow" horzOverflow="overflow" vert="vert" wrap="square" lIns="96012" tIns="48006" rIns="96012" bIns="48006" numCol="1" spcCol="0" rtlCol="0" fromWordArt="0" anchor="ctr" anchorCtr="0" forceAA="0" compatLnSpc="1">
+            <a:prstTxWarp prst="textNoShape">
+              <a:avLst/>
+            </a:prstTxWarp>
+            <a:noAutofit/>
+          </a:bodyPr>
+          <a:lstStyle/>
+          <a:p>
+            <a:pPr algn="ctr"/>
+            <a:r>
+              <a:rPr lang="de-DE" sz="6600" dirty="0"/>
+              <a:t>HAUPT SCHALTER</a:t>
+            </a:r>
+            <a:endParaRPr lang="de-DE" sz="2940" dirty="0"/>
+          </a:p>
+        </p:txBody>
+      </p:sp>
+      <p:cxnSp>
+        <p:nvCxnSpPr>
+          <p:cNvPr id="3" name="Gerader Verbinder 2">
+            <a:extLst>
+              <a:ext uri="{FF2B5EF4-FFF2-40B4-BE49-F238E27FC236}">
+                <a16:creationId xmlns:a16="http://schemas.microsoft.com/office/drawing/2014/main" id="{B90A6B4E-9624-4699-B55E-C760FC36CAD7}"/>
+              </a:ext>
+            </a:extLst>
+          </p:cNvPr>
+          <p:cNvCxnSpPr>
+            <a:cxnSpLocks/>
+          </p:cNvCxnSpPr>
+          <p:nvPr/>
+        </p:nvCxnSpPr>
+        <p:spPr>
+          <a:xfrm>
+            <a:off x="566670" y="4365938"/>
+            <a:ext cx="3386311" cy="0"/>
+          </a:xfrm>
+          <a:prstGeom prst="line">
+            <a:avLst/>
+          </a:prstGeom>
+          <a:ln w="76200">
+            <a:solidFill>
+              <a:schemeClr val="accent2">
+                <a:lumMod val="50000"/>
+              </a:schemeClr>
+            </a:solidFill>
+          </a:ln>
+        </p:spPr>
+        <p:style>
+          <a:lnRef idx="1">
+            <a:schemeClr val="accent1"/>
+          </a:lnRef>
+          <a:fillRef idx="0">
+            <a:schemeClr val="accent1"/>
+          </a:fillRef>
+          <a:effectRef idx="0">
+            <a:schemeClr val="accent1"/>
+          </a:effectRef>
+          <a:fontRef idx="minor">
+            <a:schemeClr val="tx1"/>
+          </a:fontRef>
+        </p:style>
+      </p:cxnSp>
+      <p:cxnSp>
+        <p:nvCxnSpPr>
+          <p:cNvPr id="174" name="Gerader Verbinder 173">
+            <a:extLst>
+              <a:ext uri="{FF2B5EF4-FFF2-40B4-BE49-F238E27FC236}">
+                <a16:creationId xmlns:a16="http://schemas.microsoft.com/office/drawing/2014/main" id="{5D9A2BBD-AA89-4BE0-9283-C4FEAAB2612F}"/>
+              </a:ext>
+            </a:extLst>
+          </p:cNvPr>
+          <p:cNvCxnSpPr/>
+          <p:nvPr/>
+        </p:nvCxnSpPr>
+        <p:spPr>
+          <a:xfrm>
+            <a:off x="604474" y="6310648"/>
+            <a:ext cx="3348507" cy="0"/>
+          </a:xfrm>
+          <a:prstGeom prst="line">
+            <a:avLst/>
+          </a:prstGeom>
+          <a:ln w="76200"/>
+        </p:spPr>
+        <p:style>
+          <a:lnRef idx="1">
+            <a:schemeClr val="accent1"/>
+          </a:lnRef>
+          <a:fillRef idx="0">
+            <a:schemeClr val="accent1"/>
+          </a:fillRef>
+          <a:effectRef idx="0">
+            <a:schemeClr val="accent1"/>
+          </a:effectRef>
+          <a:fontRef idx="minor">
+            <a:schemeClr val="tx1"/>
+          </a:fontRef>
+        </p:style>
+      </p:cxnSp>
+      <p:cxnSp>
+        <p:nvCxnSpPr>
+          <p:cNvPr id="175" name="Gerader Verbinder 174">
+            <a:extLst>
+              <a:ext uri="{FF2B5EF4-FFF2-40B4-BE49-F238E27FC236}">
+                <a16:creationId xmlns:a16="http://schemas.microsoft.com/office/drawing/2014/main" id="{ED73430B-4CAB-45B5-962F-24CED9CF9B32}"/>
+              </a:ext>
+            </a:extLst>
+          </p:cNvPr>
+          <p:cNvCxnSpPr>
+            <a:cxnSpLocks/>
+          </p:cNvCxnSpPr>
+          <p:nvPr/>
+        </p:nvCxnSpPr>
+        <p:spPr>
+          <a:xfrm>
+            <a:off x="9603956" y="6439437"/>
+            <a:ext cx="3505904" cy="0"/>
+          </a:xfrm>
+          <a:prstGeom prst="line">
+            <a:avLst/>
+          </a:prstGeom>
+          <a:ln w="76200"/>
+        </p:spPr>
+        <p:style>
+          <a:lnRef idx="1">
+            <a:schemeClr val="accent1"/>
+          </a:lnRef>
+          <a:fillRef idx="0">
+            <a:schemeClr val="accent1"/>
+          </a:fillRef>
+          <a:effectRef idx="0">
+            <a:schemeClr val="accent1"/>
+          </a:effectRef>
+          <a:fontRef idx="minor">
+            <a:schemeClr val="tx1"/>
+          </a:fontRef>
+        </p:style>
+      </p:cxnSp>
+      <p:cxnSp>
+        <p:nvCxnSpPr>
+          <p:cNvPr id="178" name="Gerader Verbinder 177">
+            <a:extLst>
+              <a:ext uri="{FF2B5EF4-FFF2-40B4-BE49-F238E27FC236}">
+                <a16:creationId xmlns:a16="http://schemas.microsoft.com/office/drawing/2014/main" id="{6415ECF1-880D-450B-B4A3-AF40DB4EF6B8}"/>
+              </a:ext>
+            </a:extLst>
+          </p:cNvPr>
+          <p:cNvCxnSpPr/>
+          <p:nvPr/>
+        </p:nvCxnSpPr>
+        <p:spPr>
+          <a:xfrm>
+            <a:off x="9603956" y="4623516"/>
+            <a:ext cx="3348507" cy="0"/>
+          </a:xfrm>
+          <a:prstGeom prst="line">
+            <a:avLst/>
+          </a:prstGeom>
+          <a:ln w="76200">
+            <a:solidFill>
+              <a:schemeClr val="accent2">
+                <a:lumMod val="50000"/>
+              </a:schemeClr>
+            </a:solidFill>
+          </a:ln>
+        </p:spPr>
+        <p:style>
+          <a:lnRef idx="1">
+            <a:schemeClr val="accent1"/>
+          </a:lnRef>
+          <a:fillRef idx="0">
+            <a:schemeClr val="accent1"/>
+          </a:fillRef>
+          <a:effectRef idx="0">
+            <a:schemeClr val="accent1"/>
+          </a:effectRef>
+          <a:fontRef idx="minor">
+            <a:schemeClr val="tx1"/>
+          </a:fontRef>
+        </p:style>
+      </p:cxnSp>
+      <p:cxnSp>
+        <p:nvCxnSpPr>
+          <p:cNvPr id="180" name="Gerader Verbinder 179">
+            <a:extLst>
+              <a:ext uri="{FF2B5EF4-FFF2-40B4-BE49-F238E27FC236}">
+                <a16:creationId xmlns:a16="http://schemas.microsoft.com/office/drawing/2014/main" id="{8107A914-D89A-455C-82AC-DFFE247461F0}"/>
+              </a:ext>
+            </a:extLst>
+          </p:cNvPr>
+          <p:cNvCxnSpPr>
+            <a:cxnSpLocks/>
+          </p:cNvCxnSpPr>
+          <p:nvPr/>
+        </p:nvCxnSpPr>
+        <p:spPr>
+          <a:xfrm>
+            <a:off x="604474" y="8603087"/>
+            <a:ext cx="12489656" cy="0"/>
+          </a:xfrm>
+          <a:prstGeom prst="line">
+            <a:avLst/>
+          </a:prstGeom>
+          <a:ln w="76200">
+            <a:solidFill>
+              <a:schemeClr val="accent6">
+                <a:lumMod val="75000"/>
+              </a:schemeClr>
+            </a:solidFill>
+          </a:ln>
+        </p:spPr>
+        <p:style>
+          <a:lnRef idx="1">
+            <a:schemeClr val="accent1"/>
+          </a:lnRef>
+          <a:fillRef idx="0">
+            <a:schemeClr val="accent1"/>
+          </a:fillRef>
+          <a:effectRef idx="0">
+            <a:schemeClr val="accent1"/>
+          </a:effectRef>
+          <a:fontRef idx="minor">
+            <a:schemeClr val="tx1"/>
+          </a:fontRef>
+        </p:style>
+      </p:cxnSp>
+    </p:spTree>
+    <p:extLst>
+      <p:ext uri="{BB962C8B-B14F-4D97-AF65-F5344CB8AC3E}">
+        <p14:creationId xmlns:p14="http://schemas.microsoft.com/office/powerpoint/2010/main" val="3644932846"/>
+      </p:ext>
+    </p:extLst>
+  </p:cSld>
+  <p:clrMapOvr>
+    <a:masterClrMapping/>
+  </p:clrMapOvr>
+</p:sld>
+</file>
+
 <file path=ppt/slides/slide6.xml><?xml version="1.0" encoding="utf-8"?>
 <p:sld xmlns:a="http://schemas.openxmlformats.org/drawingml/2006/main" xmlns:r="http://schemas.openxmlformats.org/officeDocument/2006/relationships" xmlns:p="http://schemas.openxmlformats.org/presentationml/2006/main">
   <p:cSld>

</xml_diff>